<commit_message>
test results show update
</commit_message>
<xml_diff>
--- a/documentation/Сайт с тестами.pptx
+++ b/documentation/Сайт с тестами.pptx
@@ -209,7 +209,7 @@
             <a:pPr rtl="0"/>
             <a:fld id="{0A4F64A4-2AE0-480A-8C85-83B65F7BFB77}" type="datetime1">
               <a:rPr lang="ru-RU" noProof="1" smtClean="0"/>
-              <a:t>08.04.2024</a:t>
+              <a:t>11.04.2024</a:t>
             </a:fld>
             <a:endParaRPr lang="ru-RU" noProof="1"/>
           </a:p>
@@ -379,7 +379,7 @@
             <a:pPr rtl="0"/>
             <a:fld id="{86FCA235-6AFA-4ED5-8066-ABADE18396FE}" type="datetime1">
               <a:rPr lang="ru-RU" noProof="1" smtClean="0"/>
-              <a:t>08.04.2024</a:t>
+              <a:t>11.04.2024</a:t>
             </a:fld>
             <a:endParaRPr lang="ru-RU" noProof="1"/>
           </a:p>
@@ -905,7 +905,7 @@
             <a:pPr rtl="0"/>
             <a:fld id="{B98D14F6-3BD6-4829-AC11-78392C9448C4}" type="datetime1">
               <a:rPr lang="ru-RU" noProof="1" smtClean="0"/>
-              <a:t>08.04.2024</a:t>
+              <a:t>11.04.2024</a:t>
             </a:fld>
             <a:endParaRPr lang="ru-RU" noProof="1"/>
           </a:p>
@@ -1137,7 +1137,7 @@
             <a:pPr rtl="0"/>
             <a:fld id="{50CF4241-4F96-4834-AE46-35BB0CA4DE80}" type="datetime1">
               <a:rPr lang="ru-RU" noProof="1" smtClean="0"/>
-              <a:t>08.04.2024</a:t>
+              <a:t>11.04.2024</a:t>
             </a:fld>
             <a:endParaRPr lang="ru-RU" noProof="1"/>
           </a:p>
@@ -1321,7 +1321,7 @@
             <a:pPr rtl="0"/>
             <a:fld id="{1652DD94-F418-44B5-ABE5-722123F1B89C}" type="datetime1">
               <a:rPr lang="ru-RU" noProof="1" smtClean="0"/>
-              <a:t>08.04.2024</a:t>
+              <a:t>11.04.2024</a:t>
             </a:fld>
             <a:endParaRPr lang="ru-RU" noProof="1"/>
           </a:p>
@@ -1495,7 +1495,7 @@
             <a:pPr rtl="0"/>
             <a:fld id="{3B429293-1767-4AC2-BB8A-423B9DA41EE2}" type="datetime1">
               <a:rPr lang="ru-RU" noProof="1" smtClean="0"/>
-              <a:t>08.04.2024</a:t>
+              <a:t>11.04.2024</a:t>
             </a:fld>
             <a:endParaRPr lang="ru-RU" noProof="1"/>
           </a:p>
@@ -1753,7 +1753,7 @@
             <a:pPr rtl="0"/>
             <a:fld id="{CD600981-0BD9-46E6-9763-C792FCAA5155}" type="datetime1">
               <a:rPr lang="ru-RU" noProof="1" smtClean="0"/>
-              <a:t>08.04.2024</a:t>
+              <a:t>11.04.2024</a:t>
             </a:fld>
             <a:endParaRPr lang="ru-RU" noProof="1"/>
           </a:p>
@@ -2083,7 +2083,7 @@
             <a:pPr rtl="0"/>
             <a:fld id="{163647EA-04AD-4D04-A278-4E5266C109D1}" type="datetime1">
               <a:rPr lang="ru-RU" noProof="1" smtClean="0"/>
-              <a:t>08.04.2024</a:t>
+              <a:t>11.04.2024</a:t>
             </a:fld>
             <a:endParaRPr lang="ru-RU" noProof="1"/>
           </a:p>
@@ -2544,7 +2544,7 @@
             <a:pPr rtl="0"/>
             <a:fld id="{68FA2149-8A8C-431F-B777-1A067D314F37}" type="datetime1">
               <a:rPr lang="ru-RU" noProof="1" smtClean="0"/>
-              <a:t>08.04.2024</a:t>
+              <a:t>11.04.2024</a:t>
             </a:fld>
             <a:endParaRPr lang="ru-RU" noProof="1"/>
           </a:p>
@@ -2671,7 +2671,7 @@
             <a:pPr rtl="0"/>
             <a:fld id="{97BDE828-0E3D-4F4B-ADFE-F379809FC78A}" type="datetime1">
               <a:rPr lang="ru-RU" noProof="1" smtClean="0"/>
-              <a:t>08.04.2024</a:t>
+              <a:t>11.04.2024</a:t>
             </a:fld>
             <a:endParaRPr lang="ru-RU" noProof="1"/>
           </a:p>
@@ -2770,7 +2770,7 @@
             <a:pPr rtl="0"/>
             <a:fld id="{5429F030-0426-4DB9-A813-BAA7F5B3B270}" type="datetime1">
               <a:rPr lang="ru-RU" noProof="1" smtClean="0"/>
-              <a:t>08.04.2024</a:t>
+              <a:t>11.04.2024</a:t>
             </a:fld>
             <a:endParaRPr lang="ru-RU" noProof="1"/>
           </a:p>
@@ -3061,7 +3061,7 @@
             <a:pPr rtl="0"/>
             <a:fld id="{0CCC4415-3CB4-4419-AF1D-92364C39A5DF}" type="datetime1">
               <a:rPr lang="ru-RU" noProof="1" smtClean="0"/>
-              <a:t>08.04.2024</a:t>
+              <a:t>11.04.2024</a:t>
             </a:fld>
             <a:endParaRPr lang="ru-RU" noProof="1"/>
           </a:p>
@@ -3392,7 +3392,7 @@
             <a:pPr rtl="0"/>
             <a:fld id="{8211745B-C411-403B-9A98-E50B6C8457D2}" type="datetime1">
               <a:rPr lang="ru-RU" noProof="1" smtClean="0"/>
-              <a:t>08.04.2024</a:t>
+              <a:t>11.04.2024</a:t>
             </a:fld>
             <a:endParaRPr lang="ru-RU" noProof="1"/>
           </a:p>
@@ -3650,7 +3650,7 @@
             <a:pPr rtl="0"/>
             <a:fld id="{163647EA-04AD-4D04-A278-4E5266C109D1}" type="datetime1">
               <a:rPr lang="ru-RU" noProof="1" smtClean="0"/>
-              <a:t>08.04.2024</a:t>
+              <a:t>11.04.2024</a:t>
             </a:fld>
             <a:endParaRPr lang="ru-RU" noProof="1"/>
           </a:p>
@@ -4395,13 +4395,6 @@
               </a:rPr>
               <a:t>Создание сайта с возможностью прохождения различных тестов с дальнейшей возможностью сохранять результаты и обсуждать их на форуме.</a:t>
             </a:r>
-            <a:endParaRPr lang="ru-RU" sz="2400" dirty="0">
-              <a:solidFill>
-                <a:schemeClr val="tx1">
-                  <a:lumMod val="85000"/>
-                </a:schemeClr>
-              </a:solidFill>
-            </a:endParaRPr>
           </a:p>
         </p:txBody>
       </p:sp>
@@ -4834,6 +4827,30 @@
           </a:p>
         </p:txBody>
       </p:sp>
+      <p:pic>
+        <p:nvPicPr>
+          <p:cNvPr id="4" name="Рисунок 3"/>
+          <p:cNvPicPr>
+            <a:picLocks noChangeAspect="1"/>
+          </p:cNvPicPr>
+          <p:nvPr/>
+        </p:nvPicPr>
+        <p:blipFill>
+          <a:blip r:embed="rId2"/>
+          <a:stretch>
+            <a:fillRect/>
+          </a:stretch>
+        </p:blipFill>
+        <p:spPr>
+          <a:xfrm>
+            <a:off x="7390337" y="2275316"/>
+            <a:ext cx="3924859" cy="1941258"/>
+          </a:xfrm>
+          <a:prstGeom prst="rect">
+            <a:avLst/>
+          </a:prstGeom>
+        </p:spPr>
+      </p:pic>
     </p:spTree>
     <p:extLst>
       <p:ext uri="{BB962C8B-B14F-4D97-AF65-F5344CB8AC3E}">
@@ -4872,8 +4889,8 @@
         </p:nvSpPr>
         <p:spPr>
           <a:xfrm>
-            <a:off x="2184585" y="330465"/>
-            <a:ext cx="8321040" cy="6527535"/>
+            <a:off x="2184585" y="3940233"/>
+            <a:ext cx="8321040" cy="2917767"/>
           </a:xfrm>
           <a:prstGeom prst="round2SameRect">
             <a:avLst/>
@@ -4916,7 +4933,7 @@
         </p:nvSpPr>
         <p:spPr>
           <a:xfrm>
-            <a:off x="2467216" y="687913"/>
+            <a:off x="2467216" y="3572430"/>
             <a:ext cx="8246227" cy="1697840"/>
           </a:xfrm>
         </p:spPr>
@@ -5785,11 +5802,12 @@
 </file>
 
 <file path=customXml/item1.xml><?xml version="1.0" encoding="utf-8"?>
-<p:properties xmlns:p="http://schemas.microsoft.com/office/2006/metadata/properties" xmlns:xsi="http://www.w3.org/2001/XMLSchema-instance" xmlns:pc="http://schemas.microsoft.com/office/infopath/2007/PartnerControls">
-  <documentManagement>
-    <MediaServiceKeyPoints xmlns="71af3243-3dd4-4a8d-8c0d-dd76da1f02a5" xsi:nil="true"/>
-  </documentManagement>
-</p:properties>
+<?mso-contentType ?>
+<FormTemplates xmlns="http://schemas.microsoft.com/sharepoint/v3/contenttype/forms">
+  <Display>DocumentLibraryForm</Display>
+  <Edit>DocumentLibraryForm</Edit>
+  <New>DocumentLibraryForm</New>
+</FormTemplates>
 </file>
 
 <file path=customXml/item2.xml><?xml version="1.0" encoding="utf-8"?>
@@ -6004,27 +6022,17 @@
 </file>
 
 <file path=customXml/item3.xml><?xml version="1.0" encoding="utf-8"?>
-<?mso-contentType ?>
-<FormTemplates xmlns="http://schemas.microsoft.com/sharepoint/v3/contenttype/forms">
-  <Display>DocumentLibraryForm</Display>
-  <Edit>DocumentLibraryForm</Edit>
-  <New>DocumentLibraryForm</New>
-</FormTemplates>
+<p:properties xmlns:p="http://schemas.microsoft.com/office/2006/metadata/properties" xmlns:xsi="http://www.w3.org/2001/XMLSchema-instance" xmlns:pc="http://schemas.microsoft.com/office/infopath/2007/PartnerControls">
+  <documentManagement>
+    <MediaServiceKeyPoints xmlns="71af3243-3dd4-4a8d-8c0d-dd76da1f02a5" xsi:nil="true"/>
+  </documentManagement>
+</p:properties>
 </file>
 
 <file path=customXml/itemProps1.xml><?xml version="1.0" encoding="utf-8"?>
-<ds:datastoreItem xmlns:ds="http://schemas.openxmlformats.org/officeDocument/2006/customXml" ds:itemID="{F3E96646-423E-4354-94C2-1A28227BF075}">
+<ds:datastoreItem xmlns:ds="http://schemas.openxmlformats.org/officeDocument/2006/customXml" ds:itemID="{A2F4A21B-80B9-40F1-8308-E0B7F0FE0B09}">
   <ds:schemaRefs>
-    <ds:schemaRef ds:uri="http://purl.org/dc/terms/"/>
-    <ds:schemaRef ds:uri="http://schemas.openxmlformats.org/package/2006/metadata/core-properties"/>
-    <ds:schemaRef ds:uri="16c05727-aa75-4e4a-9b5f-8a80a1165891"/>
-    <ds:schemaRef ds:uri="http://schemas.microsoft.com/office/2006/documentManagement/types"/>
-    <ds:schemaRef ds:uri="http://schemas.microsoft.com/office/infopath/2007/PartnerControls"/>
-    <ds:schemaRef ds:uri="http://purl.org/dc/elements/1.1/"/>
-    <ds:schemaRef ds:uri="http://schemas.microsoft.com/office/2006/metadata/properties"/>
-    <ds:schemaRef ds:uri="71af3243-3dd4-4a8d-8c0d-dd76da1f02a5"/>
-    <ds:schemaRef ds:uri="http://www.w3.org/XML/1998/namespace"/>
-    <ds:schemaRef ds:uri="http://purl.org/dc/dcmitype/"/>
+    <ds:schemaRef ds:uri="http://schemas.microsoft.com/sharepoint/v3/contenttype/forms"/>
   </ds:schemaRefs>
 </ds:datastoreItem>
 </file>
@@ -6049,9 +6057,18 @@
 </file>
 
 <file path=customXml/itemProps3.xml><?xml version="1.0" encoding="utf-8"?>
-<ds:datastoreItem xmlns:ds="http://schemas.openxmlformats.org/officeDocument/2006/customXml" ds:itemID="{A2F4A21B-80B9-40F1-8308-E0B7F0FE0B09}">
+<ds:datastoreItem xmlns:ds="http://schemas.openxmlformats.org/officeDocument/2006/customXml" ds:itemID="{F3E96646-423E-4354-94C2-1A28227BF075}">
   <ds:schemaRefs>
-    <ds:schemaRef ds:uri="http://schemas.microsoft.com/sharepoint/v3/contenttype/forms"/>
+    <ds:schemaRef ds:uri="http://purl.org/dc/terms/"/>
+    <ds:schemaRef ds:uri="http://schemas.openxmlformats.org/package/2006/metadata/core-properties"/>
+    <ds:schemaRef ds:uri="16c05727-aa75-4e4a-9b5f-8a80a1165891"/>
+    <ds:schemaRef ds:uri="http://schemas.microsoft.com/office/2006/documentManagement/types"/>
+    <ds:schemaRef ds:uri="http://schemas.microsoft.com/office/infopath/2007/PartnerControls"/>
+    <ds:schemaRef ds:uri="http://purl.org/dc/elements/1.1/"/>
+    <ds:schemaRef ds:uri="http://schemas.microsoft.com/office/2006/metadata/properties"/>
+    <ds:schemaRef ds:uri="71af3243-3dd4-4a8d-8c0d-dd76da1f02a5"/>
+    <ds:schemaRef ds:uri="http://www.w3.org/XML/1998/namespace"/>
+    <ds:schemaRef ds:uri="http://purl.org/dc/dcmitype/"/>
   </ds:schemaRefs>
 </ds:datastoreItem>
 </file>
</xml_diff>

<commit_message>
finish presentation, requirements + some fixes
</commit_message>
<xml_diff>
--- a/documentation/Сайт с тестами.pptx
+++ b/documentation/Сайт с тестами.pptx
@@ -5,17 +5,18 @@
     <p:sldMasterId id="2147483961" r:id="rId4"/>
   </p:sldMasterIdLst>
   <p:notesMasterIdLst>
-    <p:notesMasterId r:id="rId10"/>
+    <p:notesMasterId r:id="rId11"/>
   </p:notesMasterIdLst>
   <p:handoutMasterIdLst>
-    <p:handoutMasterId r:id="rId11"/>
+    <p:handoutMasterId r:id="rId12"/>
   </p:handoutMasterIdLst>
   <p:sldIdLst>
     <p:sldId id="256" r:id="rId5"/>
     <p:sldId id="259" r:id="rId6"/>
-    <p:sldId id="260" r:id="rId7"/>
-    <p:sldId id="261" r:id="rId8"/>
-    <p:sldId id="262" r:id="rId9"/>
+    <p:sldId id="264" r:id="rId7"/>
+    <p:sldId id="263" r:id="rId8"/>
+    <p:sldId id="261" r:id="rId9"/>
+    <p:sldId id="262" r:id="rId10"/>
   </p:sldIdLst>
   <p:sldSz cx="12192000" cy="6858000"/>
   <p:notesSz cx="6858000" cy="9144000"/>
@@ -209,7 +210,7 @@
             <a:pPr rtl="0"/>
             <a:fld id="{0A4F64A4-2AE0-480A-8C85-83B65F7BFB77}" type="datetime1">
               <a:rPr lang="ru-RU" noProof="1" smtClean="0"/>
-              <a:t>11.04.2024</a:t>
+              <a:t>18.04.2024</a:t>
             </a:fld>
             <a:endParaRPr lang="ru-RU" noProof="1"/>
           </a:p>
@@ -379,7 +380,7 @@
             <a:pPr rtl="0"/>
             <a:fld id="{86FCA235-6AFA-4ED5-8066-ABADE18396FE}" type="datetime1">
               <a:rPr lang="ru-RU" noProof="1" smtClean="0"/>
-              <a:t>11.04.2024</a:t>
+              <a:t>18.04.2024</a:t>
             </a:fld>
             <a:endParaRPr lang="ru-RU" noProof="1"/>
           </a:p>
@@ -905,7 +906,7 @@
             <a:pPr rtl="0"/>
             <a:fld id="{B98D14F6-3BD6-4829-AC11-78392C9448C4}" type="datetime1">
               <a:rPr lang="ru-RU" noProof="1" smtClean="0"/>
-              <a:t>11.04.2024</a:t>
+              <a:t>18.04.2024</a:t>
             </a:fld>
             <a:endParaRPr lang="ru-RU" noProof="1"/>
           </a:p>
@@ -1137,7 +1138,7 @@
             <a:pPr rtl="0"/>
             <a:fld id="{50CF4241-4F96-4834-AE46-35BB0CA4DE80}" type="datetime1">
               <a:rPr lang="ru-RU" noProof="1" smtClean="0"/>
-              <a:t>11.04.2024</a:t>
+              <a:t>18.04.2024</a:t>
             </a:fld>
             <a:endParaRPr lang="ru-RU" noProof="1"/>
           </a:p>
@@ -1321,7 +1322,7 @@
             <a:pPr rtl="0"/>
             <a:fld id="{1652DD94-F418-44B5-ABE5-722123F1B89C}" type="datetime1">
               <a:rPr lang="ru-RU" noProof="1" smtClean="0"/>
-              <a:t>11.04.2024</a:t>
+              <a:t>18.04.2024</a:t>
             </a:fld>
             <a:endParaRPr lang="ru-RU" noProof="1"/>
           </a:p>
@@ -1495,7 +1496,7 @@
             <a:pPr rtl="0"/>
             <a:fld id="{3B429293-1767-4AC2-BB8A-423B9DA41EE2}" type="datetime1">
               <a:rPr lang="ru-RU" noProof="1" smtClean="0"/>
-              <a:t>11.04.2024</a:t>
+              <a:t>18.04.2024</a:t>
             </a:fld>
             <a:endParaRPr lang="ru-RU" noProof="1"/>
           </a:p>
@@ -1753,7 +1754,7 @@
             <a:pPr rtl="0"/>
             <a:fld id="{CD600981-0BD9-46E6-9763-C792FCAA5155}" type="datetime1">
               <a:rPr lang="ru-RU" noProof="1" smtClean="0"/>
-              <a:t>11.04.2024</a:t>
+              <a:t>18.04.2024</a:t>
             </a:fld>
             <a:endParaRPr lang="ru-RU" noProof="1"/>
           </a:p>
@@ -2083,7 +2084,7 @@
             <a:pPr rtl="0"/>
             <a:fld id="{163647EA-04AD-4D04-A278-4E5266C109D1}" type="datetime1">
               <a:rPr lang="ru-RU" noProof="1" smtClean="0"/>
-              <a:t>11.04.2024</a:t>
+              <a:t>18.04.2024</a:t>
             </a:fld>
             <a:endParaRPr lang="ru-RU" noProof="1"/>
           </a:p>
@@ -2544,7 +2545,7 @@
             <a:pPr rtl="0"/>
             <a:fld id="{68FA2149-8A8C-431F-B777-1A067D314F37}" type="datetime1">
               <a:rPr lang="ru-RU" noProof="1" smtClean="0"/>
-              <a:t>11.04.2024</a:t>
+              <a:t>18.04.2024</a:t>
             </a:fld>
             <a:endParaRPr lang="ru-RU" noProof="1"/>
           </a:p>
@@ -2671,7 +2672,7 @@
             <a:pPr rtl="0"/>
             <a:fld id="{97BDE828-0E3D-4F4B-ADFE-F379809FC78A}" type="datetime1">
               <a:rPr lang="ru-RU" noProof="1" smtClean="0"/>
-              <a:t>11.04.2024</a:t>
+              <a:t>18.04.2024</a:t>
             </a:fld>
             <a:endParaRPr lang="ru-RU" noProof="1"/>
           </a:p>
@@ -2770,7 +2771,7 @@
             <a:pPr rtl="0"/>
             <a:fld id="{5429F030-0426-4DB9-A813-BAA7F5B3B270}" type="datetime1">
               <a:rPr lang="ru-RU" noProof="1" smtClean="0"/>
-              <a:t>11.04.2024</a:t>
+              <a:t>18.04.2024</a:t>
             </a:fld>
             <a:endParaRPr lang="ru-RU" noProof="1"/>
           </a:p>
@@ -3061,7 +3062,7 @@
             <a:pPr rtl="0"/>
             <a:fld id="{0CCC4415-3CB4-4419-AF1D-92364C39A5DF}" type="datetime1">
               <a:rPr lang="ru-RU" noProof="1" smtClean="0"/>
-              <a:t>11.04.2024</a:t>
+              <a:t>18.04.2024</a:t>
             </a:fld>
             <a:endParaRPr lang="ru-RU" noProof="1"/>
           </a:p>
@@ -3392,7 +3393,7 @@
             <a:pPr rtl="0"/>
             <a:fld id="{8211745B-C411-403B-9A98-E50B6C8457D2}" type="datetime1">
               <a:rPr lang="ru-RU" noProof="1" smtClean="0"/>
-              <a:t>11.04.2024</a:t>
+              <a:t>18.04.2024</a:t>
             </a:fld>
             <a:endParaRPr lang="ru-RU" noProof="1"/>
           </a:p>
@@ -3650,7 +3651,7 @@
             <a:pPr rtl="0"/>
             <a:fld id="{163647EA-04AD-4D04-A278-4E5266C109D1}" type="datetime1">
               <a:rPr lang="ru-RU" noProof="1" smtClean="0"/>
-              <a:t>11.04.2024</a:t>
+              <a:t>18.04.2024</a:t>
             </a:fld>
             <a:endParaRPr lang="ru-RU" noProof="1"/>
           </a:p>
@@ -4250,8 +4251,8 @@
         </p:nvSpPr>
         <p:spPr>
           <a:xfrm>
-            <a:off x="6919006" y="4421688"/>
-            <a:ext cx="3994015" cy="2071220"/>
+            <a:off x="8421250" y="4852103"/>
+            <a:ext cx="3888766" cy="1347329"/>
           </a:xfrm>
           <a:effectLst/>
         </p:spPr>
@@ -4267,7 +4268,7 @@
               </a:lnSpc>
             </a:pPr>
             <a:r>
-              <a:rPr lang="ru-RU" sz="2800" noProof="1" smtClean="0"/>
+              <a:rPr lang="ru-RU" sz="2000" noProof="1" smtClean="0"/>
               <a:t>Ильинский Павел</a:t>
             </a:r>
           </a:p>
@@ -4278,7 +4279,7 @@
               </a:lnSpc>
             </a:pPr>
             <a:r>
-              <a:rPr lang="ru-RU" sz="2800" noProof="1" smtClean="0"/>
+              <a:rPr lang="ru-RU" sz="2000" noProof="1" smtClean="0"/>
               <a:t>Баксанская Ксения</a:t>
             </a:r>
           </a:p>
@@ -4289,10 +4290,10 @@
               </a:lnSpc>
             </a:pPr>
             <a:r>
-              <a:rPr lang="ru-RU" sz="2800" noProof="1" smtClean="0"/>
+              <a:rPr lang="ru-RU" sz="2000" noProof="1" smtClean="0"/>
               <a:t>Перевалов Артемий</a:t>
             </a:r>
-            <a:endParaRPr lang="ru-RU" sz="2800" noProof="1"/>
+            <a:endParaRPr lang="ru-RU" sz="2000" noProof="1"/>
           </a:p>
         </p:txBody>
       </p:sp>
@@ -4376,7 +4377,7 @@
         <p:spPr>
           <a:xfrm>
             <a:off x="1261872" y="2132556"/>
-            <a:ext cx="5022937" cy="4168036"/>
+            <a:ext cx="5301766" cy="3065745"/>
           </a:xfrm>
         </p:spPr>
         <p:txBody>
@@ -4386,7 +4387,7 @@
           <a:lstStyle/>
           <a:p>
             <a:r>
-              <a:rPr lang="ru-RU" sz="2400" dirty="0">
+              <a:rPr lang="ru-RU" sz="2600" dirty="0">
                 <a:solidFill>
                   <a:schemeClr val="tx1">
                     <a:lumMod val="85000"/>
@@ -4400,14 +4401,14 @@
       </p:sp>
       <p:sp>
         <p:nvSpPr>
-          <p:cNvPr id="5" name="Прямоугольник 4"/>
+          <p:cNvPr id="7" name="Прямоугольник 6"/>
           <p:cNvSpPr/>
           <p:nvPr/>
         </p:nvSpPr>
         <p:spPr>
           <a:xfrm>
-            <a:off x="7152362" y="1034525"/>
-            <a:ext cx="4400811" cy="4835047"/>
+            <a:off x="7389854" y="2132556"/>
+            <a:ext cx="3290338" cy="3231716"/>
           </a:xfrm>
           <a:prstGeom prst="rect">
             <a:avLst/>
@@ -4438,6 +4439,47 @@
           </a:p>
         </p:txBody>
       </p:sp>
+      <p:pic>
+        <p:nvPicPr>
+          <p:cNvPr id="8" name="Picture 2" descr="https://i.pinimg.com/564x/bd/10/bd/bd10bd50581d0957ea3b8097b3a9b8cb.jpg"/>
+          <p:cNvPicPr>
+            <a:picLocks noChangeAspect="1" noChangeArrowheads="1"/>
+          </p:cNvPicPr>
+          <p:nvPr/>
+        </p:nvPicPr>
+        <p:blipFill>
+          <a:blip r:embed="rId2">
+            <a:extLst>
+              <a:ext uri="{28A0092B-C50C-407E-A947-70E740481C1C}">
+                <a14:useLocalDpi xmlns:a14="http://schemas.microsoft.com/office/drawing/2010/main" val="0"/>
+              </a:ext>
+            </a:extLst>
+          </a:blip>
+          <a:srcRect/>
+          <a:stretch>
+            <a:fillRect/>
+          </a:stretch>
+        </p:blipFill>
+        <p:spPr bwMode="auto">
+          <a:xfrm>
+            <a:off x="7601660" y="2315050"/>
+            <a:ext cx="2866726" cy="2866727"/>
+          </a:xfrm>
+          <a:prstGeom prst="rect">
+            <a:avLst/>
+          </a:prstGeom>
+          <a:noFill/>
+          <a:extLst>
+            <a:ext uri="{909E8E84-426E-40DD-AFC4-6F175D3DCCD1}">
+              <a14:hiddenFill xmlns:a14="http://schemas.microsoft.com/office/drawing/2010/main">
+                <a:solidFill>
+                  <a:srgbClr val="FFFFFF"/>
+                </a:solidFill>
+              </a14:hiddenFill>
+            </a:ext>
+          </a:extLst>
+        </p:spPr>
+      </p:pic>
     </p:spTree>
     <p:extLst>
       <p:ext uri="{BB962C8B-B14F-4D97-AF65-F5344CB8AC3E}">
@@ -4448,6 +4490,13 @@
   <p:clrMapOvr>
     <a:masterClrMapping/>
   </p:clrMapOvr>
+  <p:timing>
+    <p:tnLst>
+      <p:par>
+        <p:cTn id="1" dur="indefinite" restart="never" nodeType="tmRoot"/>
+      </p:par>
+    </p:tnLst>
+  </p:timing>
 </p:sld>
 </file>
 
@@ -4492,7 +4541,7 @@
           <a:p>
             <a:r>
               <a:rPr lang="ru-RU" sz="4800" dirty="0" smtClean="0"/>
-              <a:t>Структура проекта</a:t>
+              <a:t>Функционал сайта</a:t>
             </a:r>
             <a:endParaRPr lang="ru-RU" sz="4800" dirty="0"/>
           </a:p>
@@ -4520,110 +4569,116 @@
           </a:bodyPr>
           <a:lstStyle/>
           <a:p>
-            <a:pPr marL="342900" lvl="0" indent="-342900">
+            <a:pPr marL="342900" indent="-342900">
               <a:buFont typeface="Arial" panose="020B0604020202020204" pitchFamily="34" charset="0"/>
               <a:buChar char="•"/>
             </a:pPr>
             <a:r>
-              <a:rPr lang="ru-RU" sz="2400" dirty="0">
-                <a:solidFill>
-                  <a:schemeClr val="tx1">
-                    <a:lumMod val="85000"/>
-                  </a:schemeClr>
-                </a:solidFill>
-              </a:rPr>
-              <a:t>Раздел с новостями – страница с тематическими для сайта новостями</a:t>
-            </a:r>
-          </a:p>
-          <a:p>
-            <a:pPr marL="342900" lvl="0" indent="-342900">
+              <a:rPr lang="ru-RU" sz="2400" dirty="0" smtClean="0"/>
+              <a:t>Прохождение тестов</a:t>
+            </a:r>
+            <a:r>
+              <a:rPr lang="en-US" sz="2400" dirty="0" smtClean="0"/>
+              <a:t>, </a:t>
+            </a:r>
+            <a:r>
+              <a:rPr lang="ru-RU" sz="2400" dirty="0" smtClean="0"/>
+              <a:t>сохранение результатов</a:t>
+            </a:r>
+          </a:p>
+          <a:p>
+            <a:pPr marL="342900" indent="-342900">
               <a:buFont typeface="Arial" panose="020B0604020202020204" pitchFamily="34" charset="0"/>
               <a:buChar char="•"/>
             </a:pPr>
             <a:r>
-              <a:rPr lang="ru-RU" sz="2400" dirty="0">
-                <a:solidFill>
-                  <a:schemeClr val="tx1">
-                    <a:lumMod val="85000"/>
-                  </a:schemeClr>
-                </a:solidFill>
-              </a:rPr>
-              <a:t>Раздел с форумом – главный форум, где могут общаться пользователи</a:t>
-            </a:r>
-          </a:p>
-          <a:p>
-            <a:pPr marL="342900" lvl="0" indent="-342900">
+              <a:rPr lang="ru-RU" sz="2400" dirty="0" smtClean="0"/>
+              <a:t>Просмотр тематических новостей</a:t>
+            </a:r>
+          </a:p>
+          <a:p>
+            <a:pPr marL="342900" indent="-342900">
               <a:buFont typeface="Arial" panose="020B0604020202020204" pitchFamily="34" charset="0"/>
               <a:buChar char="•"/>
             </a:pPr>
             <a:r>
-              <a:rPr lang="ru-RU" sz="2400" dirty="0">
-                <a:solidFill>
-                  <a:schemeClr val="tx1">
-                    <a:lumMod val="85000"/>
-                  </a:schemeClr>
-                </a:solidFill>
-              </a:rPr>
-              <a:t>Раздел с поддержкой – страница для связи с поддержкой</a:t>
-            </a:r>
-          </a:p>
-          <a:p>
-            <a:pPr marL="342900" lvl="0" indent="-342900">
+              <a:rPr lang="ru-RU" sz="2400" dirty="0" smtClean="0"/>
+              <a:t>Личный кабинет</a:t>
+            </a:r>
+            <a:r>
+              <a:rPr lang="en-US" sz="2400" dirty="0" smtClean="0"/>
+              <a:t>,</a:t>
+            </a:r>
+            <a:r>
+              <a:rPr lang="ru-RU" sz="2400" dirty="0" smtClean="0"/>
+              <a:t> настройка своего профиля</a:t>
+            </a:r>
+          </a:p>
+          <a:p>
+            <a:pPr marL="342900" indent="-342900">
               <a:buFont typeface="Arial" panose="020B0604020202020204" pitchFamily="34" charset="0"/>
               <a:buChar char="•"/>
             </a:pPr>
             <a:r>
-              <a:rPr lang="ru-RU" sz="2400" dirty="0">
-                <a:solidFill>
-                  <a:schemeClr val="tx1">
-                    <a:lumMod val="85000"/>
-                  </a:schemeClr>
-                </a:solidFill>
-              </a:rPr>
-              <a:t>Личный кабинет – страница с описанием и результатами тестов пользователя</a:t>
-            </a:r>
-          </a:p>
-          <a:p>
-            <a:pPr marL="342900" lvl="0" indent="-342900">
+              <a:rPr lang="ru-RU" sz="2400" dirty="0" smtClean="0"/>
+              <a:t>Страница с форумом</a:t>
+            </a:r>
+            <a:r>
+              <a:rPr lang="en-US" sz="2400" dirty="0" smtClean="0"/>
+              <a:t>, </a:t>
+            </a:r>
+            <a:r>
+              <a:rPr lang="ru-RU" sz="2400" dirty="0" smtClean="0"/>
+              <a:t>где могут общаться пользователи</a:t>
+            </a:r>
+          </a:p>
+          <a:p>
+            <a:pPr marL="342900" indent="-342900">
               <a:buFont typeface="Arial" panose="020B0604020202020204" pitchFamily="34" charset="0"/>
               <a:buChar char="•"/>
             </a:pPr>
             <a:r>
-              <a:rPr lang="ru-RU" sz="2400" dirty="0" smtClean="0">
-                <a:solidFill>
-                  <a:schemeClr val="tx1">
-                    <a:lumMod val="85000"/>
-                  </a:schemeClr>
-                </a:solidFill>
-              </a:rPr>
-              <a:t>Раздел </a:t>
-            </a:r>
-            <a:r>
-              <a:rPr lang="ru-RU" sz="2400" dirty="0">
-                <a:solidFill>
-                  <a:schemeClr val="tx1">
-                    <a:lumMod val="85000"/>
-                  </a:schemeClr>
-                </a:solidFill>
-              </a:rPr>
-              <a:t>теста – страница выбранного пользователем теста с его описанием и комментариями под ним</a:t>
-            </a:r>
-          </a:p>
-          <a:p>
-            <a:endParaRPr lang="ru-RU" dirty="0"/>
+              <a:rPr lang="ru-RU" sz="2400" dirty="0" smtClean="0"/>
+              <a:t>Возможность оставлять комментарии под тестами</a:t>
+            </a:r>
+          </a:p>
+          <a:p>
+            <a:pPr marL="342900" indent="-342900">
+              <a:buFont typeface="Arial" panose="020B0604020202020204" pitchFamily="34" charset="0"/>
+              <a:buChar char="•"/>
+            </a:pPr>
+            <a:r>
+              <a:rPr lang="ru-RU" sz="2400" dirty="0" smtClean="0"/>
+              <a:t>Возможность написать в поддержку</a:t>
+            </a:r>
+            <a:endParaRPr lang="ru-RU" sz="2400" dirty="0" smtClean="0"/>
+          </a:p>
+          <a:p>
+            <a:pPr marL="342900" indent="-342900">
+              <a:buFont typeface="Arial" panose="020B0604020202020204" pitchFamily="34" charset="0"/>
+              <a:buChar char="•"/>
+            </a:pPr>
+            <a:endParaRPr lang="ru-RU" dirty="0" smtClean="0"/>
           </a:p>
         </p:txBody>
       </p:sp>
     </p:spTree>
     <p:extLst>
       <p:ext uri="{BB962C8B-B14F-4D97-AF65-F5344CB8AC3E}">
-        <p14:creationId xmlns:p14="http://schemas.microsoft.com/office/powerpoint/2010/main" val="3134767655"/>
+        <p14:creationId xmlns:p14="http://schemas.microsoft.com/office/powerpoint/2010/main" val="1237084494"/>
       </p:ext>
     </p:extLst>
   </p:cSld>
   <p:clrMapOvr>
     <a:masterClrMapping/>
   </p:clrMapOvr>
+  <p:timing>
+    <p:tnLst>
+      <p:par>
+        <p:cTn id="1" dur="indefinite" restart="never" nodeType="tmRoot"/>
+      </p:par>
+    </p:tnLst>
+  </p:timing>
 </p:sld>
 </file>
 
@@ -4646,14 +4701,418 @@
       </p:grpSpPr>
       <p:sp>
         <p:nvSpPr>
-          <p:cNvPr id="5" name="Прямоугольник 4"/>
+          <p:cNvPr id="11" name="Прямоугольник 10"/>
           <p:cNvSpPr/>
           <p:nvPr/>
         </p:nvSpPr>
         <p:spPr>
           <a:xfrm>
-            <a:off x="7152362" y="2029216"/>
-            <a:ext cx="4400811" cy="3231716"/>
+            <a:off x="352103" y="5408567"/>
+            <a:ext cx="3147292" cy="966597"/>
+          </a:xfrm>
+          <a:prstGeom prst="rect">
+            <a:avLst/>
+          </a:prstGeom>
+          <a:ln>
+            <a:noFill/>
+          </a:ln>
+        </p:spPr>
+        <p:style>
+          <a:lnRef idx="2">
+            <a:schemeClr val="accent1">
+              <a:shade val="50000"/>
+            </a:schemeClr>
+          </a:lnRef>
+          <a:fillRef idx="1">
+            <a:schemeClr val="accent1"/>
+          </a:fillRef>
+          <a:effectRef idx="0">
+            <a:schemeClr val="accent1"/>
+          </a:effectRef>
+          <a:fontRef idx="minor">
+            <a:schemeClr val="lt1"/>
+          </a:fontRef>
+        </p:style>
+        <p:txBody>
+          <a:bodyPr rtlCol="0" anchor="ctr"/>
+          <a:lstStyle/>
+          <a:p>
+            <a:pPr algn="ctr"/>
+            <a:endParaRPr lang="ru-RU"/>
+          </a:p>
+        </p:txBody>
+      </p:sp>
+      <p:sp>
+        <p:nvSpPr>
+          <p:cNvPr id="2" name="Заголовок 1"/>
+          <p:cNvSpPr>
+            <a:spLocks noGrp="1"/>
+          </p:cNvSpPr>
+          <p:nvPr>
+            <p:ph type="ctrTitle"/>
+          </p:nvPr>
+        </p:nvSpPr>
+        <p:spPr>
+          <a:xfrm>
+            <a:off x="1261872" y="758952"/>
+            <a:ext cx="9418320" cy="719119"/>
+          </a:xfrm>
+        </p:spPr>
+        <p:txBody>
+          <a:bodyPr>
+            <a:normAutofit/>
+          </a:bodyPr>
+          <a:lstStyle/>
+          <a:p>
+            <a:r>
+              <a:rPr lang="ru-RU" sz="4800" dirty="0" smtClean="0"/>
+              <a:t>Использованные технологии</a:t>
+            </a:r>
+            <a:endParaRPr lang="ru-RU" sz="4800" dirty="0"/>
+          </a:p>
+        </p:txBody>
+      </p:sp>
+      <p:sp>
+        <p:nvSpPr>
+          <p:cNvPr id="3" name="Подзаголовок 2"/>
+          <p:cNvSpPr>
+            <a:spLocks noGrp="1"/>
+          </p:cNvSpPr>
+          <p:nvPr>
+            <p:ph type="subTitle" idx="1"/>
+          </p:nvPr>
+        </p:nvSpPr>
+        <p:spPr>
+          <a:xfrm>
+            <a:off x="1261872" y="1811510"/>
+            <a:ext cx="9310095" cy="4080355"/>
+          </a:xfrm>
+        </p:spPr>
+        <p:txBody>
+          <a:bodyPr>
+            <a:normAutofit/>
+          </a:bodyPr>
+          <a:lstStyle/>
+          <a:p>
+            <a:pPr marL="342900" indent="-342900">
+              <a:buFont typeface="Arial" panose="020B0604020202020204" pitchFamily="34" charset="0"/>
+              <a:buChar char="•"/>
+            </a:pPr>
+            <a:r>
+              <a:rPr lang="en-US" sz="2400" dirty="0" smtClean="0"/>
+              <a:t>Python </a:t>
+            </a:r>
+            <a:r>
+              <a:rPr lang="ru-RU" sz="2400" dirty="0" smtClean="0"/>
+              <a:t>и </a:t>
+            </a:r>
+            <a:r>
+              <a:rPr lang="en-US" sz="2400" dirty="0" smtClean="0"/>
+              <a:t>html – </a:t>
+            </a:r>
+            <a:r>
+              <a:rPr lang="ru-RU" sz="2400" dirty="0" smtClean="0"/>
+              <a:t>языки программирования</a:t>
+            </a:r>
+          </a:p>
+          <a:p>
+            <a:pPr marL="342900" indent="-342900">
+              <a:buFont typeface="Arial" panose="020B0604020202020204" pitchFamily="34" charset="0"/>
+              <a:buChar char="•"/>
+            </a:pPr>
+            <a:r>
+              <a:rPr lang="en-US" sz="2400" dirty="0" smtClean="0"/>
+              <a:t>Flask – </a:t>
+            </a:r>
+            <a:r>
+              <a:rPr lang="ru-RU" sz="2400" dirty="0" smtClean="0"/>
+              <a:t>основная работа с сервером</a:t>
+            </a:r>
+          </a:p>
+          <a:p>
+            <a:pPr marL="342900" indent="-342900">
+              <a:buFont typeface="Arial" panose="020B0604020202020204" pitchFamily="34" charset="0"/>
+              <a:buChar char="•"/>
+            </a:pPr>
+            <a:r>
+              <a:rPr lang="en-US" sz="2400" dirty="0" err="1" smtClean="0"/>
+              <a:t>Sqlalchemy</a:t>
+            </a:r>
+            <a:r>
+              <a:rPr lang="en-US" sz="2400" dirty="0" smtClean="0"/>
+              <a:t> – </a:t>
+            </a:r>
+            <a:r>
+              <a:rPr lang="ru-RU" sz="2400" dirty="0" smtClean="0"/>
+              <a:t>работа с базой данных</a:t>
+            </a:r>
+            <a:endParaRPr lang="en-US" sz="2400" dirty="0" smtClean="0"/>
+          </a:p>
+          <a:p>
+            <a:pPr marL="342900" indent="-342900">
+              <a:buFont typeface="Arial" panose="020B0604020202020204" pitchFamily="34" charset="0"/>
+              <a:buChar char="•"/>
+            </a:pPr>
+            <a:r>
+              <a:rPr lang="en-US" sz="2400" dirty="0" smtClean="0"/>
+              <a:t>Requests – </a:t>
+            </a:r>
+            <a:r>
+              <a:rPr lang="ru-RU" sz="2400" dirty="0" smtClean="0"/>
+              <a:t>для работы с </a:t>
+            </a:r>
+            <a:r>
+              <a:rPr lang="en-US" sz="2400" dirty="0" smtClean="0"/>
+              <a:t>API</a:t>
+            </a:r>
+          </a:p>
+          <a:p>
+            <a:pPr marL="342900" indent="-342900">
+              <a:buFont typeface="Arial" panose="020B0604020202020204" pitchFamily="34" charset="0"/>
+              <a:buChar char="•"/>
+            </a:pPr>
+            <a:r>
+              <a:rPr lang="en-US" sz="2400" dirty="0" err="1" smtClean="0"/>
+              <a:t>Datetime</a:t>
+            </a:r>
+            <a:r>
+              <a:rPr lang="en-US" sz="2400" dirty="0" smtClean="0"/>
+              <a:t>, </a:t>
+            </a:r>
+            <a:r>
+              <a:rPr lang="en-US" sz="2400" dirty="0" err="1" smtClean="0"/>
+              <a:t>json</a:t>
+            </a:r>
+            <a:r>
+              <a:rPr lang="en-US" sz="2400" dirty="0" smtClean="0"/>
+              <a:t> </a:t>
+            </a:r>
+            <a:r>
+              <a:rPr lang="ru-RU" sz="2400" dirty="0" smtClean="0"/>
+              <a:t>и другие – для удобства и работы кода</a:t>
+            </a:r>
+          </a:p>
+          <a:p>
+            <a:pPr marL="342900" indent="-342900">
+              <a:buFont typeface="Arial" panose="020B0604020202020204" pitchFamily="34" charset="0"/>
+              <a:buChar char="•"/>
+            </a:pPr>
+            <a:endParaRPr lang="ru-RU" dirty="0" smtClean="0"/>
+          </a:p>
+        </p:txBody>
+      </p:sp>
+      <p:pic>
+        <p:nvPicPr>
+          <p:cNvPr id="5" name="Рисунок 4"/>
+          <p:cNvPicPr>
+            <a:picLocks noChangeAspect="1"/>
+          </p:cNvPicPr>
+          <p:nvPr/>
+        </p:nvPicPr>
+        <p:blipFill>
+          <a:blip r:embed="rId2">
+            <a:extLst>
+              <a:ext uri="{28A0092B-C50C-407E-A947-70E740481C1C}">
+                <a14:useLocalDpi xmlns:a14="http://schemas.microsoft.com/office/drawing/2010/main" val="0"/>
+              </a:ext>
+            </a:extLst>
+          </a:blip>
+          <a:stretch>
+            <a:fillRect/>
+          </a:stretch>
+        </p:blipFill>
+        <p:spPr>
+          <a:xfrm>
+            <a:off x="10624104" y="5408567"/>
+            <a:ext cx="966597" cy="966597"/>
+          </a:xfrm>
+          <a:prstGeom prst="rect">
+            <a:avLst/>
+          </a:prstGeom>
+        </p:spPr>
+      </p:pic>
+      <p:pic>
+        <p:nvPicPr>
+          <p:cNvPr id="1029" name="Picture 5" descr="Flask — UberLab 7 documentation"/>
+          <p:cNvPicPr>
+            <a:picLocks noChangeAspect="1" noChangeArrowheads="1"/>
+          </p:cNvPicPr>
+          <p:nvPr/>
+        </p:nvPicPr>
+        <p:blipFill>
+          <a:blip r:embed="rId3">
+            <a:extLst>
+              <a:ext uri="{28A0092B-C50C-407E-A947-70E740481C1C}">
+                <a14:useLocalDpi xmlns:a14="http://schemas.microsoft.com/office/drawing/2010/main" val="0"/>
+              </a:ext>
+            </a:extLst>
+          </a:blip>
+          <a:srcRect/>
+          <a:stretch>
+            <a:fillRect/>
+          </a:stretch>
+        </p:blipFill>
+        <p:spPr bwMode="auto">
+          <a:xfrm>
+            <a:off x="518708" y="5436512"/>
+            <a:ext cx="2814081" cy="910706"/>
+          </a:xfrm>
+          <a:prstGeom prst="rect">
+            <a:avLst/>
+          </a:prstGeom>
+          <a:noFill/>
+          <a:extLst>
+            <a:ext uri="{909E8E84-426E-40DD-AFC4-6F175D3DCCD1}">
+              <a14:hiddenFill xmlns:a14="http://schemas.microsoft.com/office/drawing/2010/main">
+                <a:solidFill>
+                  <a:srgbClr val="FFFFFF"/>
+                </a:solidFill>
+              </a14:hiddenFill>
+            </a:ext>
+          </a:extLst>
+        </p:spPr>
+      </p:pic>
+    </p:spTree>
+    <p:extLst>
+      <p:ext uri="{BB962C8B-B14F-4D97-AF65-F5344CB8AC3E}">
+        <p14:creationId xmlns:p14="http://schemas.microsoft.com/office/powerpoint/2010/main" val="1566288409"/>
+      </p:ext>
+    </p:extLst>
+  </p:cSld>
+  <p:clrMapOvr>
+    <a:masterClrMapping/>
+  </p:clrMapOvr>
+  <p:timing>
+    <p:tnLst>
+      <p:par>
+        <p:cTn id="1" dur="indefinite" restart="never" nodeType="tmRoot"/>
+      </p:par>
+    </p:tnLst>
+  </p:timing>
+</p:sld>
+</file>
+
+<file path=ppt/slides/slide5.xml><?xml version="1.0" encoding="utf-8"?>
+<p:sld xmlns:a="http://schemas.openxmlformats.org/drawingml/2006/main" xmlns:r="http://schemas.openxmlformats.org/officeDocument/2006/relationships" xmlns:p="http://schemas.openxmlformats.org/presentationml/2006/main">
+  <p:cSld>
+    <p:spTree>
+      <p:nvGrpSpPr>
+        <p:cNvPr id="1" name=""/>
+        <p:cNvGrpSpPr/>
+        <p:nvPr/>
+      </p:nvGrpSpPr>
+      <p:grpSpPr>
+        <a:xfrm>
+          <a:off x="0" y="0"/>
+          <a:ext cx="0" cy="0"/>
+          <a:chOff x="0" y="0"/>
+          <a:chExt cx="0" cy="0"/>
+        </a:xfrm>
+      </p:grpSpPr>
+      <p:sp>
+        <p:nvSpPr>
+          <p:cNvPr id="2" name="Заголовок 1"/>
+          <p:cNvSpPr>
+            <a:spLocks noGrp="1"/>
+          </p:cNvSpPr>
+          <p:nvPr>
+            <p:ph type="ctrTitle"/>
+          </p:nvPr>
+        </p:nvSpPr>
+        <p:spPr>
+          <a:xfrm>
+            <a:off x="1261872" y="796530"/>
+            <a:ext cx="9418320" cy="719119"/>
+          </a:xfrm>
+        </p:spPr>
+        <p:txBody>
+          <a:bodyPr>
+            <a:normAutofit/>
+          </a:bodyPr>
+          <a:lstStyle/>
+          <a:p>
+            <a:r>
+              <a:rPr lang="ru-RU" sz="4800" dirty="0" smtClean="0"/>
+              <a:t>Дальнейшее развитие</a:t>
+            </a:r>
+            <a:endParaRPr lang="ru-RU" sz="4800" dirty="0"/>
+          </a:p>
+        </p:txBody>
+      </p:sp>
+      <p:sp>
+        <p:nvSpPr>
+          <p:cNvPr id="3" name="Подзаголовок 2"/>
+          <p:cNvSpPr>
+            <a:spLocks noGrp="1"/>
+          </p:cNvSpPr>
+          <p:nvPr>
+            <p:ph type="subTitle" idx="1"/>
+          </p:nvPr>
+        </p:nvSpPr>
+        <p:spPr>
+          <a:xfrm>
+            <a:off x="1261872" y="2132556"/>
+            <a:ext cx="5022937" cy="4168036"/>
+          </a:xfrm>
+        </p:spPr>
+        <p:txBody>
+          <a:bodyPr>
+            <a:normAutofit/>
+          </a:bodyPr>
+          <a:lstStyle/>
+          <a:p>
+            <a:pPr marL="342900" indent="-342900">
+              <a:buFont typeface="Arial" panose="020B0604020202020204" pitchFamily="34" charset="0"/>
+              <a:buChar char="•"/>
+            </a:pPr>
+            <a:r>
+              <a:rPr lang="ru-RU" sz="2400" dirty="0" smtClean="0"/>
+              <a:t>Возможность создания тестов </a:t>
+            </a:r>
+            <a:r>
+              <a:rPr lang="ru-RU" sz="2400" dirty="0" smtClean="0"/>
+              <a:t>пользователем</a:t>
+            </a:r>
+          </a:p>
+          <a:p>
+            <a:pPr marL="342900" indent="-342900">
+              <a:buFont typeface="Arial" panose="020B0604020202020204" pitchFamily="34" charset="0"/>
+              <a:buChar char="•"/>
+            </a:pPr>
+            <a:r>
+              <a:rPr lang="ru-RU" sz="2400" dirty="0" smtClean="0"/>
+              <a:t>Развитие функционала </a:t>
+            </a:r>
+            <a:r>
+              <a:rPr lang="ru-RU" sz="2400" dirty="0" err="1" smtClean="0"/>
+              <a:t>аватара</a:t>
+            </a:r>
+            <a:r>
+              <a:rPr lang="ru-RU" sz="2400" dirty="0" smtClean="0"/>
+              <a:t> пользователя</a:t>
+            </a:r>
+            <a:r>
+              <a:rPr lang="en-US" sz="2400" dirty="0" smtClean="0"/>
+              <a:t>, </a:t>
+            </a:r>
+            <a:r>
+              <a:rPr lang="ru-RU" sz="2400" dirty="0" smtClean="0"/>
+              <a:t>возможность выбора своего собственного</a:t>
+            </a:r>
+            <a:endParaRPr lang="ru-RU" sz="2400" dirty="0" smtClean="0"/>
+          </a:p>
+        </p:txBody>
+      </p:sp>
+      <p:sp>
+        <p:nvSpPr>
+          <p:cNvPr id="7" name="Прямоугольник 6"/>
+          <p:cNvSpPr/>
+          <p:nvPr/>
+        </p:nvSpPr>
+        <p:spPr>
+          <a:xfrm>
+            <a:off x="6909952" y="2132556"/>
+            <a:ext cx="3419606" cy="3315138"/>
           </a:xfrm>
           <a:prstGeom prst="rect">
             <a:avLst/>
@@ -4684,171 +5143,45 @@
           </a:p>
         </p:txBody>
       </p:sp>
-      <p:sp>
-        <p:nvSpPr>
-          <p:cNvPr id="2" name="Заголовок 1"/>
-          <p:cNvSpPr>
-            <a:spLocks noGrp="1"/>
-          </p:cNvSpPr>
-          <p:nvPr>
-            <p:ph type="ctrTitle"/>
-          </p:nvPr>
-        </p:nvSpPr>
-        <p:spPr>
-          <a:xfrm>
-            <a:off x="1261872" y="796530"/>
-            <a:ext cx="9418320" cy="719119"/>
-          </a:xfrm>
-        </p:spPr>
-        <p:txBody>
-          <a:bodyPr>
-            <a:normAutofit/>
-          </a:bodyPr>
-          <a:lstStyle/>
-          <a:p>
-            <a:r>
-              <a:rPr lang="ru-RU" sz="4800" dirty="0" smtClean="0"/>
-              <a:t>Дальнейшее развитие</a:t>
-            </a:r>
-            <a:endParaRPr lang="ru-RU" sz="4800" dirty="0"/>
-          </a:p>
-        </p:txBody>
-      </p:sp>
-      <p:sp>
-        <p:nvSpPr>
-          <p:cNvPr id="3" name="Подзаголовок 2"/>
-          <p:cNvSpPr>
-            <a:spLocks noGrp="1"/>
-          </p:cNvSpPr>
-          <p:nvPr>
-            <p:ph type="subTitle" idx="1"/>
-          </p:nvPr>
-        </p:nvSpPr>
-        <p:spPr>
-          <a:xfrm>
-            <a:off x="1261872" y="2132556"/>
-            <a:ext cx="5022937" cy="4168036"/>
-          </a:xfrm>
-        </p:spPr>
-        <p:txBody>
-          <a:bodyPr>
-            <a:normAutofit/>
-          </a:bodyPr>
-          <a:lstStyle/>
-          <a:p>
-            <a:pPr marL="342900" indent="-342900">
-              <a:buFont typeface="Arial" panose="020B0604020202020204" pitchFamily="34" charset="0"/>
-              <a:buChar char="•"/>
-            </a:pPr>
-            <a:r>
-              <a:rPr lang="ru-RU" sz="2400" dirty="0" smtClean="0">
-                <a:solidFill>
-                  <a:schemeClr val="tx1">
-                    <a:lumMod val="85000"/>
-                  </a:schemeClr>
-                </a:solidFill>
-              </a:rPr>
-              <a:t>Возможность создания тестов пользователем</a:t>
-            </a:r>
-          </a:p>
-          <a:p>
-            <a:pPr marL="342900" lvl="0" indent="-342900">
-              <a:buFont typeface="Arial" panose="020B0604020202020204" pitchFamily="34" charset="0"/>
-              <a:buChar char="•"/>
-            </a:pPr>
-            <a:r>
-              <a:rPr lang="ru-RU" sz="2400" dirty="0"/>
-              <a:t>Добавление рекламы с целью заработка </a:t>
-            </a:r>
-            <a:r>
-              <a:rPr lang="ru-RU" sz="2400" dirty="0" smtClean="0"/>
-              <a:t>денег</a:t>
-            </a:r>
-            <a:endParaRPr lang="ru-RU" sz="2400" dirty="0" smtClean="0">
-              <a:solidFill>
-                <a:schemeClr val="tx1">
-                  <a:lumMod val="85000"/>
-                </a:schemeClr>
-              </a:solidFill>
-            </a:endParaRPr>
-          </a:p>
-          <a:p>
-            <a:pPr marL="342900" indent="-342900">
-              <a:buFont typeface="Arial" panose="020B0604020202020204" pitchFamily="34" charset="0"/>
-              <a:buChar char="•"/>
-            </a:pPr>
-            <a:r>
-              <a:rPr lang="ru-RU" sz="2400" dirty="0">
-                <a:solidFill>
-                  <a:schemeClr val="tx1">
-                    <a:lumMod val="85000"/>
-                  </a:schemeClr>
-                </a:solidFill>
-              </a:rPr>
-              <a:t> </a:t>
-            </a:r>
-            <a:r>
-              <a:rPr lang="ru-RU" sz="2400" dirty="0" smtClean="0">
-                <a:solidFill>
-                  <a:schemeClr val="tx1">
-                    <a:lumMod val="85000"/>
-                  </a:schemeClr>
-                </a:solidFill>
-              </a:rPr>
-              <a:t>Я не знаю</a:t>
-            </a:r>
-            <a:r>
-              <a:rPr lang="en-US" sz="2400" dirty="0" smtClean="0">
-                <a:solidFill>
-                  <a:schemeClr val="tx1">
-                    <a:lumMod val="85000"/>
-                  </a:schemeClr>
-                </a:solidFill>
-              </a:rPr>
-              <a:t>, </a:t>
-            </a:r>
-            <a:r>
-              <a:rPr lang="ru-RU" sz="2400" dirty="0" smtClean="0">
-                <a:solidFill>
-                  <a:schemeClr val="tx1">
-                    <a:lumMod val="85000"/>
-                  </a:schemeClr>
-                </a:solidFill>
-              </a:rPr>
-              <a:t>что еще тут может быть</a:t>
-            </a:r>
-            <a:endParaRPr lang="ru-RU" sz="2400" dirty="0">
-              <a:solidFill>
-                <a:schemeClr val="tx1">
-                  <a:lumMod val="85000"/>
-                </a:schemeClr>
-              </a:solidFill>
-            </a:endParaRPr>
-          </a:p>
-        </p:txBody>
-      </p:sp>
       <p:pic>
         <p:nvPicPr>
-          <p:cNvPr id="4" name="Рисунок 3"/>
+          <p:cNvPr id="2052" name="Picture 4" descr="https://i.pinimg.com/564x/35/98/2d/35982d742990304afcdb0d3a16a52be6.jpg"/>
           <p:cNvPicPr>
-            <a:picLocks noChangeAspect="1"/>
+            <a:picLocks noChangeAspect="1" noChangeArrowheads="1"/>
           </p:cNvPicPr>
           <p:nvPr/>
         </p:nvPicPr>
         <p:blipFill>
-          <a:blip r:embed="rId2"/>
+          <a:blip r:embed="rId2">
+            <a:extLst>
+              <a:ext uri="{28A0092B-C50C-407E-A947-70E740481C1C}">
+                <a14:useLocalDpi xmlns:a14="http://schemas.microsoft.com/office/drawing/2010/main" val="0"/>
+              </a:ext>
+            </a:extLst>
+          </a:blip>
+          <a:srcRect/>
           <a:stretch>
             <a:fillRect/>
           </a:stretch>
         </p:blipFill>
-        <p:spPr>
+        <p:spPr bwMode="auto">
           <a:xfrm>
-            <a:off x="7390337" y="2275316"/>
-            <a:ext cx="3924859" cy="1941258"/>
+            <a:off x="7077205" y="2247575"/>
+            <a:ext cx="3085100" cy="3085100"/>
           </a:xfrm>
           <a:prstGeom prst="rect">
             <a:avLst/>
           </a:prstGeom>
+          <a:noFill/>
+          <a:extLst>
+            <a:ext uri="{909E8E84-426E-40DD-AFC4-6F175D3DCCD1}">
+              <a14:hiddenFill xmlns:a14="http://schemas.microsoft.com/office/drawing/2010/main">
+                <a:solidFill>
+                  <a:srgbClr val="FFFFFF"/>
+                </a:solidFill>
+              </a14:hiddenFill>
+            </a:ext>
+          </a:extLst>
         </p:spPr>
       </p:pic>
     </p:spTree>
@@ -4861,10 +5194,17 @@
   <p:clrMapOvr>
     <a:masterClrMapping/>
   </p:clrMapOvr>
+  <p:timing>
+    <p:tnLst>
+      <p:par>
+        <p:cTn id="1" dur="indefinite" restart="never" nodeType="tmRoot"/>
+      </p:par>
+    </p:tnLst>
+  </p:timing>
 </p:sld>
 </file>
 
-<file path=ppt/slides/slide5.xml><?xml version="1.0" encoding="utf-8"?>
+<file path=ppt/slides/slide6.xml><?xml version="1.0" encoding="utf-8"?>
 <p:sld xmlns:a="http://schemas.openxmlformats.org/drawingml/2006/main" xmlns:r="http://schemas.openxmlformats.org/officeDocument/2006/relationships" xmlns:p="http://schemas.openxmlformats.org/presentationml/2006/main">
   <p:cSld>
     <p:spTree>
@@ -4889,8 +5229,8 @@
         </p:nvSpPr>
         <p:spPr>
           <a:xfrm>
-            <a:off x="2184585" y="3940233"/>
-            <a:ext cx="8321040" cy="2917767"/>
+            <a:off x="2051581" y="4033381"/>
+            <a:ext cx="8321040" cy="2830853"/>
           </a:xfrm>
           <a:prstGeom prst="round2SameRect">
             <a:avLst/>
@@ -4933,7 +5273,7 @@
         </p:nvSpPr>
         <p:spPr>
           <a:xfrm>
-            <a:off x="2467216" y="3572430"/>
+            <a:off x="2229222" y="3509800"/>
             <a:ext cx="8246227" cy="1697840"/>
           </a:xfrm>
         </p:spPr>
@@ -4945,37 +5285,13 @@
           <a:p>
             <a:r>
               <a:rPr lang="ru-RU" sz="4800" dirty="0" smtClean="0"/>
-              <a:t>Перейдем к демонстрации</a:t>
+              <a:t>Перейдем к </a:t>
+            </a:r>
+            <a:r>
+              <a:rPr lang="ru-RU" sz="4800" dirty="0" smtClean="0"/>
+              <a:t>демонстрации</a:t>
             </a:r>
             <a:endParaRPr lang="ru-RU" sz="4800" dirty="0"/>
-          </a:p>
-        </p:txBody>
-      </p:sp>
-      <p:sp>
-        <p:nvSpPr>
-          <p:cNvPr id="4" name="Подзаголовок 3"/>
-          <p:cNvSpPr>
-            <a:spLocks noGrp="1"/>
-          </p:cNvSpPr>
-          <p:nvPr>
-            <p:ph type="subTitle" idx="1"/>
-          </p:nvPr>
-        </p:nvSpPr>
-        <p:spPr>
-          <a:xfrm>
-            <a:off x="1502941" y="4559531"/>
-            <a:ext cx="9418320" cy="1691640"/>
-          </a:xfrm>
-        </p:spPr>
-        <p:txBody>
-          <a:bodyPr/>
-          <a:lstStyle/>
-          <a:p>
-            <a:r>
-              <a:rPr lang="ru-RU" dirty="0" smtClean="0"/>
-              <a:t>	</a:t>
-            </a:r>
-            <a:endParaRPr lang="ru-RU" dirty="0"/>
           </a:p>
         </p:txBody>
       </p:sp>
@@ -4989,6 +5305,13 @@
   <p:clrMapOvr>
     <a:masterClrMapping/>
   </p:clrMapOvr>
+  <p:timing>
+    <p:tnLst>
+      <p:par>
+        <p:cTn id="1" dur="indefinite" restart="never" nodeType="tmRoot"/>
+      </p:par>
+    </p:tnLst>
+  </p:timing>
 </p:sld>
 </file>
 
@@ -5802,12 +6125,11 @@
 </file>
 
 <file path=customXml/item1.xml><?xml version="1.0" encoding="utf-8"?>
-<?mso-contentType ?>
-<FormTemplates xmlns="http://schemas.microsoft.com/sharepoint/v3/contenttype/forms">
-  <Display>DocumentLibraryForm</Display>
-  <Edit>DocumentLibraryForm</Edit>
-  <New>DocumentLibraryForm</New>
-</FormTemplates>
+<p:properties xmlns:p="http://schemas.microsoft.com/office/2006/metadata/properties" xmlns:xsi="http://www.w3.org/2001/XMLSchema-instance" xmlns:pc="http://schemas.microsoft.com/office/infopath/2007/PartnerControls">
+  <documentManagement>
+    <MediaServiceKeyPoints xmlns="71af3243-3dd4-4a8d-8c0d-dd76da1f02a5" xsi:nil="true"/>
+  </documentManagement>
+</p:properties>
 </file>
 
 <file path=customXml/item2.xml><?xml version="1.0" encoding="utf-8"?>
@@ -6022,17 +6344,27 @@
 </file>
 
 <file path=customXml/item3.xml><?xml version="1.0" encoding="utf-8"?>
-<p:properties xmlns:p="http://schemas.microsoft.com/office/2006/metadata/properties" xmlns:xsi="http://www.w3.org/2001/XMLSchema-instance" xmlns:pc="http://schemas.microsoft.com/office/infopath/2007/PartnerControls">
-  <documentManagement>
-    <MediaServiceKeyPoints xmlns="71af3243-3dd4-4a8d-8c0d-dd76da1f02a5" xsi:nil="true"/>
-  </documentManagement>
-</p:properties>
+<?mso-contentType ?>
+<FormTemplates xmlns="http://schemas.microsoft.com/sharepoint/v3/contenttype/forms">
+  <Display>DocumentLibraryForm</Display>
+  <Edit>DocumentLibraryForm</Edit>
+  <New>DocumentLibraryForm</New>
+</FormTemplates>
 </file>
 
 <file path=customXml/itemProps1.xml><?xml version="1.0" encoding="utf-8"?>
-<ds:datastoreItem xmlns:ds="http://schemas.openxmlformats.org/officeDocument/2006/customXml" ds:itemID="{A2F4A21B-80B9-40F1-8308-E0B7F0FE0B09}">
+<ds:datastoreItem xmlns:ds="http://schemas.openxmlformats.org/officeDocument/2006/customXml" ds:itemID="{F3E96646-423E-4354-94C2-1A28227BF075}">
   <ds:schemaRefs>
-    <ds:schemaRef ds:uri="http://schemas.microsoft.com/sharepoint/v3/contenttype/forms"/>
+    <ds:schemaRef ds:uri="http://schemas.microsoft.com/office/2006/metadata/properties"/>
+    <ds:schemaRef ds:uri="http://purl.org/dc/terms/"/>
+    <ds:schemaRef ds:uri="http://schemas.openxmlformats.org/package/2006/metadata/core-properties"/>
+    <ds:schemaRef ds:uri="16c05727-aa75-4e4a-9b5f-8a80a1165891"/>
+    <ds:schemaRef ds:uri="http://schemas.microsoft.com/office/2006/documentManagement/types"/>
+    <ds:schemaRef ds:uri="http://schemas.microsoft.com/office/infopath/2007/PartnerControls"/>
+    <ds:schemaRef ds:uri="http://purl.org/dc/elements/1.1/"/>
+    <ds:schemaRef ds:uri="71af3243-3dd4-4a8d-8c0d-dd76da1f02a5"/>
+    <ds:schemaRef ds:uri="http://www.w3.org/XML/1998/namespace"/>
+    <ds:schemaRef ds:uri="http://purl.org/dc/dcmitype/"/>
   </ds:schemaRefs>
 </ds:datastoreItem>
 </file>
@@ -6057,18 +6389,9 @@
 </file>
 
 <file path=customXml/itemProps3.xml><?xml version="1.0" encoding="utf-8"?>
-<ds:datastoreItem xmlns:ds="http://schemas.openxmlformats.org/officeDocument/2006/customXml" ds:itemID="{F3E96646-423E-4354-94C2-1A28227BF075}">
+<ds:datastoreItem xmlns:ds="http://schemas.openxmlformats.org/officeDocument/2006/customXml" ds:itemID="{A2F4A21B-80B9-40F1-8308-E0B7F0FE0B09}">
   <ds:schemaRefs>
-    <ds:schemaRef ds:uri="http://purl.org/dc/terms/"/>
-    <ds:schemaRef ds:uri="http://schemas.openxmlformats.org/package/2006/metadata/core-properties"/>
-    <ds:schemaRef ds:uri="16c05727-aa75-4e4a-9b5f-8a80a1165891"/>
-    <ds:schemaRef ds:uri="http://schemas.microsoft.com/office/2006/documentManagement/types"/>
-    <ds:schemaRef ds:uri="http://schemas.microsoft.com/office/infopath/2007/PartnerControls"/>
-    <ds:schemaRef ds:uri="http://purl.org/dc/elements/1.1/"/>
-    <ds:schemaRef ds:uri="http://schemas.microsoft.com/office/2006/metadata/properties"/>
-    <ds:schemaRef ds:uri="71af3243-3dd4-4a8d-8c0d-dd76da1f02a5"/>
-    <ds:schemaRef ds:uri="http://www.w3.org/XML/1998/namespace"/>
-    <ds:schemaRef ds:uri="http://purl.org/dc/dcmitype/"/>
+    <ds:schemaRef ds:uri="http://schemas.microsoft.com/sharepoint/v3/contenttype/forms"/>
   </ds:schemaRefs>
 </ds:datastoreItem>
 </file>
</xml_diff>